<commit_message>
Cleaning up a few things, starting to set up synonyms
</commit_message>
<xml_diff>
--- a/search-driven-apps.pptx
+++ b/search-driven-apps.pptx
@@ -534,6 +534,21 @@
           <a:lstStyle/>
           <a:p>
             <a:r>
+              <a:rPr lang="en-US" dirty="0"/>
+              <a:t>Joe Zack, long time dev, podcaster</a:t>
+            </a:r>
+          </a:p>
+          <a:p>
+            <a:r>
+              <a:rPr lang="en-US" dirty="0"/>
+              <a:t>Talking about search driven apps, focus on Elasticsearch</a:t>
+            </a:r>
+          </a:p>
+          <a:p>
+            <a:endParaRPr lang="en-US" dirty="0"/>
+          </a:p>
+          <a:p>
+            <a:r>
               <a:rPr lang="en-US" dirty="0" err="1"/>
               <a:t>ElasticSearch</a:t>
             </a:r>
@@ -1055,45 +1070,11 @@
               <a:tabLst/>
               <a:defRPr/>
             </a:pPr>
-            <a:endParaRPr lang="en-US" dirty="0">
-              <a:effectLst/>
-            </a:endParaRPr>
-          </a:p>
-          <a:p>
-            <a:pPr marL="0" marR="0" lvl="0" indent="0" algn="l" defTabSz="914400" rtl="0" eaLnBrk="1" fontAlgn="auto" latinLnBrk="0" hangingPunct="1">
-              <a:lnSpc>
-                <a:spcPct val="100000"/>
-              </a:lnSpc>
-              <a:spcBef>
-                <a:spcPts val="0"/>
-              </a:spcBef>
-              <a:spcAft>
-                <a:spcPts val="0"/>
-              </a:spcAft>
-              <a:buClrTx/>
-              <a:buSzTx/>
-              <a:buFontTx/>
-              <a:buNone/>
-              <a:tabLst/>
-              <a:defRPr/>
-            </a:pPr>
             <a:r>
               <a:rPr lang="en-US" dirty="0">
                 <a:effectLst/>
               </a:rPr>
-              <a:t>Lots of data: relational </a:t>
-            </a:r>
-            <a:r>
-              <a:rPr lang="en-US" dirty="0" err="1">
-                <a:effectLst/>
-              </a:rPr>
-              <a:t>db</a:t>
-            </a:r>
-            <a:r>
-              <a:rPr lang="en-US" dirty="0">
-                <a:effectLst/>
-              </a:rPr>
-              <a:t> don’t scale well, denormalization</a:t>
+              <a:t>Google obviously, but think about how other experiences are changing now Cortana on windows, Spotlight on mac, Hey Alexa</a:t>
             </a:r>
           </a:p>
           <a:p>
@@ -1140,43 +1121,81 @@
               <a:rPr lang="en-US" dirty="0">
                 <a:effectLst/>
               </a:rPr>
-              <a:t>Many types of applications built around searching and filtering. You can </a:t>
+              <a:t>We’re people, we’re not good at exact.</a:t>
+            </a:r>
+          </a:p>
+          <a:p>
+            <a:pPr marL="0" marR="0" lvl="0" indent="0" algn="l" defTabSz="914400" rtl="0" eaLnBrk="1" fontAlgn="auto" latinLnBrk="0" hangingPunct="1">
+              <a:lnSpc>
+                <a:spcPct val="100000"/>
+              </a:lnSpc>
+              <a:spcBef>
+                <a:spcPts val="0"/>
+              </a:spcBef>
+              <a:spcAft>
+                <a:spcPts val="0"/>
+              </a:spcAft>
+              <a:buClrTx/>
+              <a:buSzTx/>
+              <a:buFontTx/>
+              <a:buNone/>
+              <a:tabLst/>
+              <a:defRPr/>
+            </a:pPr>
+            <a:r>
+              <a:rPr lang="en-US" dirty="0">
+                <a:effectLst/>
+              </a:rPr>
+              <a:t>Tons of data:</a:t>
+            </a:r>
+          </a:p>
+          <a:p>
+            <a:pPr marL="0" marR="0" lvl="0" indent="0" algn="l" defTabSz="914400" rtl="0" eaLnBrk="1" fontAlgn="auto" latinLnBrk="0" hangingPunct="1">
+              <a:lnSpc>
+                <a:spcPct val="100000"/>
+              </a:lnSpc>
+              <a:spcBef>
+                <a:spcPts val="0"/>
+              </a:spcBef>
+              <a:spcAft>
+                <a:spcPts val="0"/>
+              </a:spcAft>
+              <a:buClrTx/>
+              <a:buSzTx/>
+              <a:buFontTx/>
+              <a:buNone/>
+              <a:tabLst/>
+              <a:defRPr/>
+            </a:pPr>
+            <a:r>
+              <a:rPr lang="en-US" dirty="0">
+                <a:effectLst/>
+              </a:rPr>
+              <a:t>5B videos watched on YouTube every day: https://</a:t>
             </a:r>
             <a:r>
               <a:rPr lang="en-US" dirty="0" err="1">
                 <a:effectLst/>
               </a:rPr>
-              <a:t>kinda</a:t>
+              <a:t>merchdope.com</a:t>
             </a:r>
             <a:r>
               <a:rPr lang="en-US" dirty="0">
                 <a:effectLst/>
               </a:rPr>
-              <a:t> do this by hand, but unless you're really careful with design this can spiral into a big </a:t>
+              <a:t>/</a:t>
             </a:r>
             <a:r>
               <a:rPr lang="en-US" dirty="0" err="1">
                 <a:effectLst/>
               </a:rPr>
-              <a:t>ol</a:t>
+              <a:t>youtube</a:t>
             </a:r>
             <a:r>
               <a:rPr lang="en-US" dirty="0">
                 <a:effectLst/>
               </a:rPr>
-              <a:t>' mess of dynamic </a:t>
-            </a:r>
-            <a:r>
-              <a:rPr lang="en-US" dirty="0" err="1">
-                <a:effectLst/>
-              </a:rPr>
-              <a:t>sql</a:t>
-            </a:r>
-            <a:r>
-              <a:rPr lang="en-US" dirty="0">
-                <a:effectLst/>
-              </a:rPr>
-              <a:t> code where ever schema change requires increasingly ugly code changes</a:t>
+              <a:t>-statistics/</a:t>
             </a:r>
           </a:p>
           <a:p>
@@ -1223,6 +1242,245 @@
               <a:rPr lang="en-US" dirty="0">
                 <a:effectLst/>
               </a:rPr>
+              <a:t>How are we inexact people searching?</a:t>
+            </a:r>
+          </a:p>
+          <a:p>
+            <a:pPr marL="0" marR="0" lvl="0" indent="0" algn="l" defTabSz="914400" rtl="0" eaLnBrk="1" fontAlgn="auto" latinLnBrk="0" hangingPunct="1">
+              <a:lnSpc>
+                <a:spcPct val="100000"/>
+              </a:lnSpc>
+              <a:spcBef>
+                <a:spcPts val="0"/>
+              </a:spcBef>
+              <a:spcAft>
+                <a:spcPts val="0"/>
+              </a:spcAft>
+              <a:buClrTx/>
+              <a:buSzTx/>
+              <a:buFontTx/>
+              <a:buNone/>
+              <a:tabLst/>
+              <a:defRPr/>
+            </a:pPr>
+            <a:endParaRPr lang="en-US" dirty="0">
+              <a:effectLst/>
+            </a:endParaRPr>
+          </a:p>
+          <a:p>
+            <a:pPr marL="0" marR="0" lvl="0" indent="0" algn="l" defTabSz="914400" rtl="0" eaLnBrk="1" fontAlgn="auto" latinLnBrk="0" hangingPunct="1">
+              <a:lnSpc>
+                <a:spcPct val="100000"/>
+              </a:lnSpc>
+              <a:spcBef>
+                <a:spcPts val="0"/>
+              </a:spcBef>
+              <a:spcAft>
+                <a:spcPts val="0"/>
+              </a:spcAft>
+              <a:buClrTx/>
+              <a:buSzTx/>
+              <a:buFontTx/>
+              <a:buNone/>
+              <a:tabLst/>
+              <a:defRPr/>
+            </a:pPr>
+            <a:r>
+              <a:rPr lang="en-US" dirty="0">
+                <a:effectLst/>
+              </a:rPr>
+              <a:t>Probably not relational </a:t>
+            </a:r>
+            <a:r>
+              <a:rPr lang="en-US" dirty="0" err="1">
+                <a:effectLst/>
+              </a:rPr>
+              <a:t>db</a:t>
+            </a:r>
+            <a:r>
+              <a:rPr lang="en-US" dirty="0">
+                <a:effectLst/>
+              </a:rPr>
+              <a:t>!</a:t>
+            </a:r>
+          </a:p>
+          <a:p>
+            <a:pPr marL="171450" marR="0" lvl="0" indent="-171450" algn="l" defTabSz="914400" rtl="0" eaLnBrk="1" fontAlgn="auto" latinLnBrk="0" hangingPunct="1">
+              <a:lnSpc>
+                <a:spcPct val="100000"/>
+              </a:lnSpc>
+              <a:spcBef>
+                <a:spcPts val="0"/>
+              </a:spcBef>
+              <a:spcAft>
+                <a:spcPts val="0"/>
+              </a:spcAft>
+              <a:buClrTx/>
+              <a:buSzTx/>
+              <a:buFont typeface="Arial" panose="020B0604020202020204" pitchFamily="34" charset="0"/>
+              <a:buChar char="•"/>
+              <a:tabLst/>
+              <a:defRPr/>
+            </a:pPr>
+            <a:r>
+              <a:rPr lang="en-US" dirty="0">
+                <a:effectLst/>
+              </a:rPr>
+              <a:t>Don’t scale horizontally very well</a:t>
+            </a:r>
+          </a:p>
+          <a:p>
+            <a:pPr marL="171450" marR="0" lvl="0" indent="-171450" algn="l" defTabSz="914400" rtl="0" eaLnBrk="1" fontAlgn="auto" latinLnBrk="0" hangingPunct="1">
+              <a:lnSpc>
+                <a:spcPct val="100000"/>
+              </a:lnSpc>
+              <a:spcBef>
+                <a:spcPts val="0"/>
+              </a:spcBef>
+              <a:spcAft>
+                <a:spcPts val="0"/>
+              </a:spcAft>
+              <a:buClrTx/>
+              <a:buSzTx/>
+              <a:buFont typeface="Arial" panose="020B0604020202020204" pitchFamily="34" charset="0"/>
+              <a:buChar char="•"/>
+              <a:tabLst/>
+              <a:defRPr/>
+            </a:pPr>
+            <a:r>
+              <a:rPr lang="en-US" dirty="0">
+                <a:effectLst/>
+              </a:rPr>
+              <a:t>Shredding is inefficient</a:t>
+            </a:r>
+          </a:p>
+          <a:p>
+            <a:pPr marL="0" marR="0" lvl="0" indent="0" algn="l" defTabSz="914400" rtl="0" eaLnBrk="1" fontAlgn="auto" latinLnBrk="0" hangingPunct="1">
+              <a:lnSpc>
+                <a:spcPct val="100000"/>
+              </a:lnSpc>
+              <a:spcBef>
+                <a:spcPts val="0"/>
+              </a:spcBef>
+              <a:spcAft>
+                <a:spcPts val="0"/>
+              </a:spcAft>
+              <a:buClrTx/>
+              <a:buSzTx/>
+              <a:buFontTx/>
+              <a:buNone/>
+              <a:tabLst/>
+              <a:defRPr/>
+            </a:pPr>
+            <a:endParaRPr lang="en-US" dirty="0">
+              <a:effectLst/>
+            </a:endParaRPr>
+          </a:p>
+          <a:p>
+            <a:pPr marL="0" marR="0" lvl="0" indent="0" algn="l" defTabSz="914400" rtl="0" eaLnBrk="1" fontAlgn="auto" latinLnBrk="0" hangingPunct="1">
+              <a:lnSpc>
+                <a:spcPct val="100000"/>
+              </a:lnSpc>
+              <a:spcBef>
+                <a:spcPts val="0"/>
+              </a:spcBef>
+              <a:spcAft>
+                <a:spcPts val="0"/>
+              </a:spcAft>
+              <a:buClrTx/>
+              <a:buSzTx/>
+              <a:buFontTx/>
+              <a:buNone/>
+              <a:tabLst/>
+              <a:defRPr/>
+            </a:pPr>
+            <a:r>
+              <a:rPr lang="en-US" dirty="0">
+                <a:effectLst/>
+              </a:rPr>
+              <a:t>Many types of applications built around searching and filtering. You can </a:t>
+            </a:r>
+            <a:r>
+              <a:rPr lang="en-US" dirty="0" err="1">
+                <a:effectLst/>
+              </a:rPr>
+              <a:t>kinda</a:t>
+            </a:r>
+            <a:r>
+              <a:rPr lang="en-US" dirty="0">
+                <a:effectLst/>
+              </a:rPr>
+              <a:t> do this by hand, but unless you're really careful with design this can spiral into a big </a:t>
+            </a:r>
+            <a:r>
+              <a:rPr lang="en-US" dirty="0" err="1">
+                <a:effectLst/>
+              </a:rPr>
+              <a:t>ol</a:t>
+            </a:r>
+            <a:r>
+              <a:rPr lang="en-US" dirty="0">
+                <a:effectLst/>
+              </a:rPr>
+              <a:t>' mess of dynamic </a:t>
+            </a:r>
+            <a:r>
+              <a:rPr lang="en-US" dirty="0" err="1">
+                <a:effectLst/>
+              </a:rPr>
+              <a:t>sql</a:t>
+            </a:r>
+            <a:r>
+              <a:rPr lang="en-US" dirty="0">
+                <a:effectLst/>
+              </a:rPr>
+              <a:t> code where ever schema change requires increasingly ugly code changes</a:t>
+            </a:r>
+          </a:p>
+          <a:p>
+            <a:pPr marL="0" marR="0" lvl="0" indent="0" algn="l" defTabSz="914400" rtl="0" eaLnBrk="1" fontAlgn="auto" latinLnBrk="0" hangingPunct="1">
+              <a:lnSpc>
+                <a:spcPct val="100000"/>
+              </a:lnSpc>
+              <a:spcBef>
+                <a:spcPts val="0"/>
+              </a:spcBef>
+              <a:spcAft>
+                <a:spcPts val="0"/>
+              </a:spcAft>
+              <a:buClrTx/>
+              <a:buSzTx/>
+              <a:buFontTx/>
+              <a:buNone/>
+              <a:tabLst/>
+              <a:defRPr/>
+            </a:pPr>
+            <a:endParaRPr lang="en-US" dirty="0">
+              <a:effectLst/>
+            </a:endParaRPr>
+          </a:p>
+          <a:p>
+            <a:pPr marL="0" marR="0" lvl="0" indent="0" algn="l" defTabSz="914400" rtl="0" eaLnBrk="1" fontAlgn="auto" latinLnBrk="0" hangingPunct="1">
+              <a:lnSpc>
+                <a:spcPct val="100000"/>
+              </a:lnSpc>
+              <a:spcBef>
+                <a:spcPts val="0"/>
+              </a:spcBef>
+              <a:spcAft>
+                <a:spcPts val="0"/>
+              </a:spcAft>
+              <a:buClrTx/>
+              <a:buSzTx/>
+              <a:buFontTx/>
+              <a:buNone/>
+              <a:tabLst/>
+              <a:defRPr/>
+            </a:pPr>
+            <a:r>
+              <a:rPr lang="en-US" dirty="0">
+                <a:effectLst/>
+              </a:rPr>
               <a:t>So…why don’t we use a </a:t>
             </a:r>
             <a:r>
@@ -1256,15 +1514,7 @@
           <a:p>
             <a:r>
               <a:rPr lang="en-US" dirty="0"/>
-              <a:t>Amazon sells </a:t>
-            </a:r>
-            <a:r>
-              <a:rPr lang="en-US"/>
-              <a:t>over 500M </a:t>
-            </a:r>
-            <a:r>
-              <a:rPr lang="en-US" dirty="0"/>
-              <a:t>products</a:t>
+              <a:t>Amazon sells over 500M products</a:t>
             </a:r>
           </a:p>
           <a:p>

</xml_diff>

<commit_message>
Cleaning up a few things, gotta get that k8s setting the vm.max_map_count though
</commit_message>
<xml_diff>
--- a/search-driven-apps.pptx
+++ b/search-driven-apps.pptx
@@ -667,6 +667,40 @@
                 <a:effectLst/>
               </a:rPr>
               <a:t>ish</a:t>
+            </a:r>
+            <a:endParaRPr lang="en-US" dirty="0">
+              <a:effectLst/>
+            </a:endParaRPr>
+          </a:p>
+          <a:p>
+            <a:pPr marL="0" marR="0" lvl="0" indent="0" algn="l" defTabSz="914400" rtl="0" eaLnBrk="1" fontAlgn="auto" latinLnBrk="0" hangingPunct="1">
+              <a:lnSpc>
+                <a:spcPct val="100000"/>
+              </a:lnSpc>
+              <a:spcBef>
+                <a:spcPts val="0"/>
+              </a:spcBef>
+              <a:spcAft>
+                <a:spcPts val="0"/>
+              </a:spcAft>
+              <a:buClrTx/>
+              <a:buSzTx/>
+              <a:buFontTx/>
+              <a:buNone/>
+              <a:tabLst/>
+              <a:defRPr/>
+            </a:pPr>
+            <a:r>
+              <a:rPr lang="en-US" dirty="0">
+                <a:effectLst/>
+              </a:rPr>
+              <a:t>NoSQL </a:t>
+            </a:r>
+            <a:r>
+              <a:rPr lang="en-US">
+                <a:effectLst/>
+              </a:rPr>
+              <a:t>before NoSQL</a:t>
             </a:r>
             <a:endParaRPr lang="en-US" dirty="0"/>
           </a:p>

</xml_diff>